<commit_message>
Add the Generic Type into GenericType.pptx
</commit_message>
<xml_diff>
--- a/JavaStudy/JavaStudyNote/GenericType/GenericType.pptx
+++ b/JavaStudy/JavaStudyNote/GenericType/GenericType.pptx
@@ -8,6 +8,8 @@
     <p:sldId id="256" r:id="rId2"/>
     <p:sldId id="257" r:id="rId3"/>
     <p:sldId id="258" r:id="rId4"/>
+    <p:sldId id="259" r:id="rId5"/>
+    <p:sldId id="260" r:id="rId6"/>
   </p:sldIdLst>
   <p:sldSz cx="12192000" cy="6858000"/>
   <p:notesSz cx="6858000" cy="9144000"/>
@@ -106,6 +108,11 @@
       </a:defRPr>
     </a:lvl9pPr>
   </p:defaultTextStyle>
+  <p:extLst>
+    <p:ext uri="{EFAFB233-063F-42B5-8137-9DF3F51BA10A}">
+      <p15:sldGuideLst xmlns:p15="http://schemas.microsoft.com/office/powerpoint/2012/main"/>
+    </p:ext>
+  </p:extLst>
 </p:presentation>
 </file>
 
@@ -3598,11 +3605,11 @@
           </a:p>
           <a:p>
             <a:r>
-              <a:rPr lang="en-US" altLang="zh-CN"/>
+              <a:rPr lang="en-US" altLang="zh-CN" dirty="0"/>
               <a:t>                     </a:t>
             </a:r>
             <a:r>
-              <a:rPr lang="zh-CN" altLang="en-US"/>
+              <a:rPr lang="zh-CN" altLang="en-US" dirty="0"/>
               <a:t>型形参传入实际的类型参数</a:t>
             </a:r>
             <a:endParaRPr lang="en-US" altLang="zh-CN" dirty="0"/>
@@ -3613,6 +3620,250 @@
     <p:extLst>
       <p:ext uri="{BB962C8B-B14F-4D97-AF65-F5344CB8AC3E}">
         <p14:creationId xmlns:p14="http://schemas.microsoft.com/office/powerpoint/2010/main" val="177660779"/>
+      </p:ext>
+    </p:extLst>
+  </p:cSld>
+  <p:clrMapOvr>
+    <a:masterClrMapping/>
+  </p:clrMapOvr>
+</p:sld>
+</file>
+
+<file path=ppt/slides/slide4.xml><?xml version="1.0" encoding="utf-8"?>
+<p:sld xmlns:a="http://schemas.openxmlformats.org/drawingml/2006/main" xmlns:r="http://schemas.openxmlformats.org/officeDocument/2006/relationships" xmlns:p="http://schemas.openxmlformats.org/presentationml/2006/main">
+  <p:cSld>
+    <p:spTree>
+      <p:nvGrpSpPr>
+        <p:cNvPr id="1" name=""/>
+        <p:cNvGrpSpPr/>
+        <p:nvPr/>
+      </p:nvGrpSpPr>
+      <p:grpSpPr>
+        <a:xfrm>
+          <a:off x="0" y="0"/>
+          <a:ext cx="0" cy="0"/>
+          <a:chOff x="0" y="0"/>
+          <a:chExt cx="0" cy="0"/>
+        </a:xfrm>
+      </p:grpSpPr>
+      <p:sp>
+        <p:nvSpPr>
+          <p:cNvPr id="4" name="文字方塊 3">
+            <a:extLst>
+              <a:ext uri="{FF2B5EF4-FFF2-40B4-BE49-F238E27FC236}">
+                <a16:creationId xmlns:a16="http://schemas.microsoft.com/office/drawing/2014/main" id="{27F9DC7B-DE6A-472C-885E-C50552B608A8}"/>
+              </a:ext>
+            </a:extLst>
+          </p:cNvPr>
+          <p:cNvSpPr txBox="1"/>
+          <p:nvPr/>
+        </p:nvSpPr>
+        <p:spPr>
+          <a:xfrm>
+            <a:off x="335280" y="304800"/>
+            <a:ext cx="11511280" cy="1477328"/>
+          </a:xfrm>
+          <a:prstGeom prst="rect">
+            <a:avLst/>
+          </a:prstGeom>
+          <a:noFill/>
+        </p:spPr>
+        <p:txBody>
+          <a:bodyPr wrap="square" rtlCol="0">
+            <a:spAutoFit/>
+          </a:bodyPr>
+          <a:lstStyle/>
+          <a:p>
+            <a:r>
+              <a:rPr lang="zh-CN" altLang="en-US" b="1" u="sng" dirty="0" smtClean="0"/>
+              <a:t>不能使用範型</a:t>
+            </a:r>
+            <a:endParaRPr lang="en-US" altLang="zh-CN" b="1" u="sng" dirty="0" smtClean="0"/>
+          </a:p>
+          <a:p>
+            <a:endParaRPr lang="en-US" altLang="zh-CN" b="1" u="sng" dirty="0"/>
+          </a:p>
+          <a:p>
+            <a:r>
+              <a:rPr lang="en-US" altLang="zh-CN" dirty="0"/>
+              <a:t>	</a:t>
+            </a:r>
+            <a:r>
+              <a:rPr lang="en-US" altLang="zh-CN" dirty="0" smtClean="0"/>
+              <a:t>1.</a:t>
+            </a:r>
+            <a:r>
+              <a:rPr lang="zh-CN" altLang="en-US" dirty="0" smtClean="0"/>
+              <a:t>静态方法</a:t>
+            </a:r>
+            <a:r>
+              <a:rPr lang="zh-CN" altLang="en-US" dirty="0"/>
+              <a:t>、静态初始化块或者静态变量（它们都是类相关的）的声明和</a:t>
+            </a:r>
+            <a:r>
+              <a:rPr lang="zh-CN" altLang="en-US" dirty="0" smtClean="0"/>
+              <a:t>初始化</a:t>
+            </a:r>
+            <a:r>
+              <a:rPr lang="zh-CN" altLang="en-US" dirty="0"/>
+              <a:t>中不允许使用泛型</a:t>
+            </a:r>
+            <a:r>
+              <a:rPr lang="zh-CN" altLang="en-US" dirty="0" smtClean="0"/>
+              <a:t>形参</a:t>
+            </a:r>
+            <a:endParaRPr lang="en-US" altLang="zh-CN" dirty="0" smtClean="0"/>
+          </a:p>
+          <a:p>
+            <a:endParaRPr lang="en-US" altLang="zh-CN" dirty="0"/>
+          </a:p>
+          <a:p>
+            <a:r>
+              <a:rPr lang="en-US" altLang="zh-CN" dirty="0" smtClean="0"/>
+              <a:t>	2. </a:t>
+            </a:r>
+            <a:r>
+              <a:rPr lang="en-US" altLang="zh-CN" dirty="0" err="1"/>
+              <a:t>instanceof</a:t>
+            </a:r>
+            <a:r>
+              <a:rPr lang="zh-CN" altLang="en-US" dirty="0"/>
+              <a:t>运算符后</a:t>
+            </a:r>
+            <a:r>
+              <a:rPr lang="zh-CN" altLang="en-US" dirty="0" smtClean="0"/>
+              <a:t>不能</a:t>
+            </a:r>
+            <a:r>
+              <a:rPr lang="zh-CN" altLang="en-US" dirty="0"/>
+              <a:t>使用泛型类</a:t>
+            </a:r>
+            <a:endParaRPr lang="en-US" altLang="zh-CN" dirty="0"/>
+          </a:p>
+        </p:txBody>
+      </p:sp>
+    </p:spTree>
+    <p:extLst>
+      <p:ext uri="{BB962C8B-B14F-4D97-AF65-F5344CB8AC3E}">
+        <p14:creationId xmlns:p14="http://schemas.microsoft.com/office/powerpoint/2010/main" val="2135005457"/>
+      </p:ext>
+    </p:extLst>
+  </p:cSld>
+  <p:clrMapOvr>
+    <a:masterClrMapping/>
+  </p:clrMapOvr>
+</p:sld>
+</file>
+
+<file path=ppt/slides/slide5.xml><?xml version="1.0" encoding="utf-8"?>
+<p:sld xmlns:a="http://schemas.openxmlformats.org/drawingml/2006/main" xmlns:r="http://schemas.openxmlformats.org/officeDocument/2006/relationships" xmlns:p="http://schemas.openxmlformats.org/presentationml/2006/main">
+  <p:cSld>
+    <p:spTree>
+      <p:nvGrpSpPr>
+        <p:cNvPr id="1" name=""/>
+        <p:cNvGrpSpPr/>
+        <p:nvPr/>
+      </p:nvGrpSpPr>
+      <p:grpSpPr>
+        <a:xfrm>
+          <a:off x="0" y="0"/>
+          <a:ext cx="0" cy="0"/>
+          <a:chOff x="0" y="0"/>
+          <a:chExt cx="0" cy="0"/>
+        </a:xfrm>
+      </p:grpSpPr>
+      <p:sp>
+        <p:nvSpPr>
+          <p:cNvPr id="4" name="文字方塊 3">
+            <a:extLst>
+              <a:ext uri="{FF2B5EF4-FFF2-40B4-BE49-F238E27FC236}">
+                <a16:creationId xmlns:a16="http://schemas.microsoft.com/office/drawing/2014/main" id="{27F9DC7B-DE6A-472C-885E-C50552B608A8}"/>
+              </a:ext>
+            </a:extLst>
+          </p:cNvPr>
+          <p:cNvSpPr txBox="1"/>
+          <p:nvPr/>
+        </p:nvSpPr>
+        <p:spPr>
+          <a:xfrm>
+            <a:off x="335280" y="304800"/>
+            <a:ext cx="11511280" cy="1200329"/>
+          </a:xfrm>
+          <a:prstGeom prst="rect">
+            <a:avLst/>
+          </a:prstGeom>
+          <a:noFill/>
+        </p:spPr>
+        <p:txBody>
+          <a:bodyPr wrap="square" rtlCol="0">
+            <a:spAutoFit/>
+          </a:bodyPr>
+          <a:lstStyle/>
+          <a:p>
+            <a:r>
+              <a:rPr lang="zh-CN" altLang="en-US" b="1" u="sng" dirty="0" smtClean="0"/>
+              <a:t>类型通配符</a:t>
+            </a:r>
+            <a:endParaRPr lang="en-US" altLang="zh-CN" b="1" u="sng" dirty="0" smtClean="0"/>
+          </a:p>
+          <a:p>
+            <a:endParaRPr lang="en-US" altLang="zh-CN" b="1" u="sng" dirty="0"/>
+          </a:p>
+          <a:p>
+            <a:r>
+              <a:rPr lang="en-US" altLang="zh-CN" dirty="0"/>
+              <a:t>	</a:t>
+            </a:r>
+            <a:r>
+              <a:rPr lang="en-US" altLang="zh-CN" dirty="0" smtClean="0"/>
+              <a:t>1.  </a:t>
+            </a:r>
+            <a:r>
+              <a:rPr lang="zh-CN" altLang="en-US" dirty="0" smtClean="0"/>
+              <a:t>书写格式</a:t>
+            </a:r>
+            <a:r>
+              <a:rPr lang="en-US" altLang="zh-CN" dirty="0" smtClean="0"/>
+              <a:t>List&lt;?&gt; list</a:t>
+            </a:r>
+          </a:p>
+          <a:p>
+            <a:r>
+              <a:rPr lang="en-US" altLang="zh-CN" dirty="0"/>
+              <a:t>	</a:t>
+            </a:r>
+            <a:r>
+              <a:rPr lang="en-US" altLang="zh-CN" dirty="0" smtClean="0"/>
+              <a:t>2.   List&lt;?&gt; list = new </a:t>
+            </a:r>
+            <a:r>
+              <a:rPr lang="en-US" altLang="zh-CN" dirty="0" err="1" smtClean="0"/>
+              <a:t>ArrayList</a:t>
+            </a:r>
+            <a:r>
+              <a:rPr lang="en-US" altLang="zh-CN" dirty="0" smtClean="0"/>
+              <a:t>();   </a:t>
+            </a:r>
+            <a:r>
+              <a:rPr lang="zh-CN" altLang="en-US" dirty="0" smtClean="0"/>
+              <a:t>此声明方式无法把除了</a:t>
+            </a:r>
+            <a:r>
+              <a:rPr lang="en-US" altLang="zh-CN" dirty="0" smtClean="0"/>
+              <a:t>null</a:t>
+            </a:r>
+            <a:r>
+              <a:rPr lang="zh-CN" altLang="en-US" smtClean="0"/>
+              <a:t>以外的数据放入集合当中</a:t>
+            </a:r>
+            <a:endParaRPr lang="en-US" altLang="zh-CN" dirty="0"/>
+          </a:p>
+        </p:txBody>
+      </p:sp>
+    </p:spTree>
+    <p:extLst>
+      <p:ext uri="{BB962C8B-B14F-4D97-AF65-F5344CB8AC3E}">
+        <p14:creationId xmlns:p14="http://schemas.microsoft.com/office/powerpoint/2010/main" val="3070462312"/>
       </p:ext>
     </p:extLst>
   </p:cSld>

</xml_diff>

<commit_message>
Add the generic type into Generic Type pptx
</commit_message>
<xml_diff>
--- a/JavaStudy/JavaStudyNote/GenericType/GenericType.pptx
+++ b/JavaStudy/JavaStudyNote/GenericType/GenericType.pptx
@@ -263,7 +263,7 @@
           <a:p>
             <a:fld id="{3DBF0C44-33E9-41EF-A3D1-86D52FE28D82}" type="datetimeFigureOut">
               <a:rPr lang="zh-TW" altLang="en-US" smtClean="0"/>
-              <a:t>2023/2/24</a:t>
+              <a:t>2023/2/25</a:t>
             </a:fld>
             <a:endParaRPr lang="zh-TW" altLang="en-US"/>
           </a:p>
@@ -461,7 +461,7 @@
           <a:p>
             <a:fld id="{3DBF0C44-33E9-41EF-A3D1-86D52FE28D82}" type="datetimeFigureOut">
               <a:rPr lang="zh-TW" altLang="en-US" smtClean="0"/>
-              <a:t>2023/2/24</a:t>
+              <a:t>2023/2/25</a:t>
             </a:fld>
             <a:endParaRPr lang="zh-TW" altLang="en-US"/>
           </a:p>
@@ -669,7 +669,7 @@
           <a:p>
             <a:fld id="{3DBF0C44-33E9-41EF-A3D1-86D52FE28D82}" type="datetimeFigureOut">
               <a:rPr lang="zh-TW" altLang="en-US" smtClean="0"/>
-              <a:t>2023/2/24</a:t>
+              <a:t>2023/2/25</a:t>
             </a:fld>
             <a:endParaRPr lang="zh-TW" altLang="en-US"/>
           </a:p>
@@ -867,7 +867,7 @@
           <a:p>
             <a:fld id="{3DBF0C44-33E9-41EF-A3D1-86D52FE28D82}" type="datetimeFigureOut">
               <a:rPr lang="zh-TW" altLang="en-US" smtClean="0"/>
-              <a:t>2023/2/24</a:t>
+              <a:t>2023/2/25</a:t>
             </a:fld>
             <a:endParaRPr lang="zh-TW" altLang="en-US"/>
           </a:p>
@@ -1142,7 +1142,7 @@
           <a:p>
             <a:fld id="{3DBF0C44-33E9-41EF-A3D1-86D52FE28D82}" type="datetimeFigureOut">
               <a:rPr lang="zh-TW" altLang="en-US" smtClean="0"/>
-              <a:t>2023/2/24</a:t>
+              <a:t>2023/2/25</a:t>
             </a:fld>
             <a:endParaRPr lang="zh-TW" altLang="en-US"/>
           </a:p>
@@ -1407,7 +1407,7 @@
           <a:p>
             <a:fld id="{3DBF0C44-33E9-41EF-A3D1-86D52FE28D82}" type="datetimeFigureOut">
               <a:rPr lang="zh-TW" altLang="en-US" smtClean="0"/>
-              <a:t>2023/2/24</a:t>
+              <a:t>2023/2/25</a:t>
             </a:fld>
             <a:endParaRPr lang="zh-TW" altLang="en-US"/>
           </a:p>
@@ -1819,7 +1819,7 @@
           <a:p>
             <a:fld id="{3DBF0C44-33E9-41EF-A3D1-86D52FE28D82}" type="datetimeFigureOut">
               <a:rPr lang="zh-TW" altLang="en-US" smtClean="0"/>
-              <a:t>2023/2/24</a:t>
+              <a:t>2023/2/25</a:t>
             </a:fld>
             <a:endParaRPr lang="zh-TW" altLang="en-US"/>
           </a:p>
@@ -1960,7 +1960,7 @@
           <a:p>
             <a:fld id="{3DBF0C44-33E9-41EF-A3D1-86D52FE28D82}" type="datetimeFigureOut">
               <a:rPr lang="zh-TW" altLang="en-US" smtClean="0"/>
-              <a:t>2023/2/24</a:t>
+              <a:t>2023/2/25</a:t>
             </a:fld>
             <a:endParaRPr lang="zh-TW" altLang="en-US"/>
           </a:p>
@@ -2073,7 +2073,7 @@
           <a:p>
             <a:fld id="{3DBF0C44-33E9-41EF-A3D1-86D52FE28D82}" type="datetimeFigureOut">
               <a:rPr lang="zh-TW" altLang="en-US" smtClean="0"/>
-              <a:t>2023/2/24</a:t>
+              <a:t>2023/2/25</a:t>
             </a:fld>
             <a:endParaRPr lang="zh-TW" altLang="en-US"/>
           </a:p>
@@ -2384,7 +2384,7 @@
           <a:p>
             <a:fld id="{3DBF0C44-33E9-41EF-A3D1-86D52FE28D82}" type="datetimeFigureOut">
               <a:rPr lang="zh-TW" altLang="en-US" smtClean="0"/>
-              <a:t>2023/2/24</a:t>
+              <a:t>2023/2/25</a:t>
             </a:fld>
             <a:endParaRPr lang="zh-TW" altLang="en-US"/>
           </a:p>
@@ -2672,7 +2672,7 @@
           <a:p>
             <a:fld id="{3DBF0C44-33E9-41EF-A3D1-86D52FE28D82}" type="datetimeFigureOut">
               <a:rPr lang="zh-TW" altLang="en-US" smtClean="0"/>
-              <a:t>2023/2/24</a:t>
+              <a:t>2023/2/25</a:t>
             </a:fld>
             <a:endParaRPr lang="zh-TW" altLang="en-US"/>
           </a:p>
@@ -2913,7 +2913,7 @@
           <a:p>
             <a:fld id="{3DBF0C44-33E9-41EF-A3D1-86D52FE28D82}" type="datetimeFigureOut">
               <a:rPr lang="zh-TW" altLang="en-US" smtClean="0"/>
-              <a:t>2023/2/24</a:t>
+              <a:t>2023/2/25</a:t>
             </a:fld>
             <a:endParaRPr lang="zh-TW" altLang="en-US"/>
           </a:p>
@@ -3675,51 +3675,31 @@
           <a:lstStyle/>
           <a:p>
             <a:r>
-              <a:rPr lang="zh-CN" altLang="en-US" b="1" u="sng" dirty="0" smtClean="0"/>
+              <a:rPr lang="zh-CN" altLang="en-US" b="1" u="sng" dirty="0"/>
               <a:t>不能使用範型</a:t>
             </a:r>
-            <a:endParaRPr lang="en-US" altLang="zh-CN" b="1" u="sng" dirty="0" smtClean="0"/>
-          </a:p>
-          <a:p>
             <a:endParaRPr lang="en-US" altLang="zh-CN" b="1" u="sng" dirty="0"/>
           </a:p>
           <a:p>
+            <a:endParaRPr lang="en-US" altLang="zh-CN" b="1" u="sng" dirty="0"/>
+          </a:p>
+          <a:p>
             <a:r>
               <a:rPr lang="en-US" altLang="zh-CN" dirty="0"/>
-              <a:t>	</a:t>
-            </a:r>
-            <a:r>
-              <a:rPr lang="en-US" altLang="zh-CN" dirty="0" smtClean="0"/>
-              <a:t>1.</a:t>
-            </a:r>
-            <a:r>
-              <a:rPr lang="zh-CN" altLang="en-US" dirty="0" smtClean="0"/>
-              <a:t>静态方法</a:t>
+              <a:t>	1.</a:t>
             </a:r>
             <a:r>
               <a:rPr lang="zh-CN" altLang="en-US" dirty="0"/>
-              <a:t>、静态初始化块或者静态变量（它们都是类相关的）的声明和</a:t>
-            </a:r>
-            <a:r>
-              <a:rPr lang="zh-CN" altLang="en-US" dirty="0" smtClean="0"/>
-              <a:t>初始化</a:t>
-            </a:r>
-            <a:r>
-              <a:rPr lang="zh-CN" altLang="en-US" dirty="0"/>
-              <a:t>中不允许使用泛型</a:t>
-            </a:r>
-            <a:r>
-              <a:rPr lang="zh-CN" altLang="en-US" dirty="0" smtClean="0"/>
-              <a:t>形参</a:t>
-            </a:r>
-            <a:endParaRPr lang="en-US" altLang="zh-CN" dirty="0" smtClean="0"/>
-          </a:p>
-          <a:p>
+              <a:t>静态方法、静态初始化块或者静态变量（它们都是类相关的）的声明和初始化中不允许使用泛型形参</a:t>
+            </a:r>
             <a:endParaRPr lang="en-US" altLang="zh-CN" dirty="0"/>
           </a:p>
           <a:p>
-            <a:r>
-              <a:rPr lang="en-US" altLang="zh-CN" dirty="0" smtClean="0"/>
+            <a:endParaRPr lang="en-US" altLang="zh-CN" dirty="0"/>
+          </a:p>
+          <a:p>
+            <a:r>
+              <a:rPr lang="en-US" altLang="zh-CN" dirty="0"/>
               <a:t>	2. </a:t>
             </a:r>
             <a:r>
@@ -3728,15 +3708,7 @@
             </a:r>
             <a:r>
               <a:rPr lang="zh-CN" altLang="en-US" dirty="0"/>
-              <a:t>运算符后</a:t>
-            </a:r>
-            <a:r>
-              <a:rPr lang="zh-CN" altLang="en-US" dirty="0" smtClean="0"/>
-              <a:t>不能</a:t>
-            </a:r>
-            <a:r>
-              <a:rPr lang="zh-CN" altLang="en-US" dirty="0"/>
-              <a:t>使用泛型类</a:t>
+              <a:t>运算符后不能使用泛型类</a:t>
             </a:r>
             <a:endParaRPr lang="en-US" altLang="zh-CN" dirty="0"/>
           </a:p>
@@ -3786,8 +3758,8 @@
         </p:nvSpPr>
         <p:spPr>
           <a:xfrm>
-            <a:off x="335280" y="304800"/>
-            <a:ext cx="11511280" cy="1200329"/>
+            <a:off x="340360" y="314960"/>
+            <a:ext cx="11511280" cy="3416320"/>
           </a:xfrm>
           <a:prstGeom prst="rect">
             <a:avLst/>
@@ -3801,60 +3773,215 @@
           <a:lstStyle/>
           <a:p>
             <a:r>
-              <a:rPr lang="zh-CN" altLang="en-US" b="1" u="sng" dirty="0" smtClean="0"/>
+              <a:rPr lang="zh-CN" altLang="en-US" b="1" u="sng" dirty="0"/>
               <a:t>类型通配符</a:t>
             </a:r>
-            <a:endParaRPr lang="en-US" altLang="zh-CN" b="1" u="sng" dirty="0" smtClean="0"/>
-          </a:p>
-          <a:p>
             <a:endParaRPr lang="en-US" altLang="zh-CN" b="1" u="sng" dirty="0"/>
           </a:p>
           <a:p>
+            <a:endParaRPr lang="en-US" altLang="zh-CN" b="1" u="sng" dirty="0"/>
+          </a:p>
+          <a:p>
             <a:r>
               <a:rPr lang="en-US" altLang="zh-CN" dirty="0"/>
-              <a:t>	</a:t>
-            </a:r>
-            <a:r>
-              <a:rPr lang="en-US" altLang="zh-CN" dirty="0" smtClean="0"/>
-              <a:t>1.  </a:t>
-            </a:r>
-            <a:r>
-              <a:rPr lang="zh-CN" altLang="en-US" dirty="0" smtClean="0"/>
+              <a:t>	1.  </a:t>
+            </a:r>
+            <a:r>
+              <a:rPr lang="zh-CN" altLang="en-US" dirty="0"/>
               <a:t>书写格式</a:t>
             </a:r>
             <a:r>
-              <a:rPr lang="en-US" altLang="zh-CN" dirty="0" smtClean="0"/>
+              <a:rPr lang="en-US" altLang="zh-CN" dirty="0"/>
               <a:t>List&lt;?&gt; list</a:t>
             </a:r>
           </a:p>
           <a:p>
             <a:r>
               <a:rPr lang="en-US" altLang="zh-CN" dirty="0"/>
-              <a:t>	</a:t>
-            </a:r>
-            <a:r>
-              <a:rPr lang="en-US" altLang="zh-CN" dirty="0" smtClean="0"/>
-              <a:t>2.   List&lt;?&gt; list = new </a:t>
-            </a:r>
-            <a:r>
-              <a:rPr lang="en-US" altLang="zh-CN" dirty="0" err="1" smtClean="0"/>
+              <a:t>	2.   List&lt;?&gt; list = new </a:t>
+            </a:r>
+            <a:r>
+              <a:rPr lang="en-US" altLang="zh-CN" dirty="0" err="1"/>
               <a:t>ArrayList</a:t>
             </a:r>
             <a:r>
-              <a:rPr lang="en-US" altLang="zh-CN" dirty="0" smtClean="0"/>
+              <a:rPr lang="en-US" altLang="zh-CN" dirty="0"/>
               <a:t>();   </a:t>
             </a:r>
             <a:r>
-              <a:rPr lang="zh-CN" altLang="en-US" dirty="0" smtClean="0"/>
+              <a:rPr lang="zh-CN" altLang="en-US" dirty="0"/>
               <a:t>此声明方式无法把除了</a:t>
             </a:r>
             <a:r>
-              <a:rPr lang="en-US" altLang="zh-CN" dirty="0" smtClean="0"/>
+              <a:rPr lang="en-US" altLang="zh-CN" dirty="0"/>
               <a:t>null</a:t>
             </a:r>
             <a:r>
-              <a:rPr lang="zh-CN" altLang="en-US" smtClean="0"/>
+              <a:rPr lang="zh-CN" altLang="en-US" dirty="0"/>
               <a:t>以外的数据放入集合当中</a:t>
+            </a:r>
+            <a:endParaRPr lang="en-US" altLang="zh-CN" dirty="0"/>
+          </a:p>
+          <a:p>
+            <a:r>
+              <a:rPr lang="en-US" altLang="zh-CN" dirty="0"/>
+              <a:t>	3.   List&lt;? extends Animal&gt;    </a:t>
+            </a:r>
+            <a:r>
+              <a:rPr lang="zh-CN" altLang="en-US" dirty="0"/>
+              <a:t>設置上限的通配符</a:t>
+            </a:r>
+            <a:r>
+              <a:rPr lang="en-US" altLang="zh-CN" dirty="0"/>
+              <a:t>, </a:t>
+            </a:r>
+            <a:r>
+              <a:rPr lang="zh-CN" altLang="en-US" dirty="0"/>
+              <a:t>指定通配符上限的集合，只能从集合中取元素</a:t>
+            </a:r>
+          </a:p>
+          <a:p>
+            <a:r>
+              <a:rPr lang="zh-CN" altLang="en-US" dirty="0"/>
+              <a:t>                                                                 （取出的元素总是上限的类型或其子类），不能向集合中添加元素（因为编译</a:t>
+            </a:r>
+            <a:endParaRPr lang="en-US" altLang="zh-CN" dirty="0"/>
+          </a:p>
+          <a:p>
+            <a:r>
+              <a:rPr lang="en-US" altLang="zh-CN" dirty="0"/>
+              <a:t>                                                                    </a:t>
+            </a:r>
+            <a:r>
+              <a:rPr lang="zh-CN" altLang="en-US" dirty="0"/>
+              <a:t>器没法确定集合元素实际是哪种子类型</a:t>
+            </a:r>
+            <a:r>
+              <a:rPr lang="en-US" altLang="zh-CN" dirty="0"/>
+              <a:t>,</a:t>
+            </a:r>
+            <a:r>
+              <a:rPr lang="zh-CN" altLang="en-US" dirty="0"/>
+              <a:t>  </a:t>
+            </a:r>
+            <a:r>
+              <a:rPr lang="en-US" altLang="zh-CN" dirty="0"/>
+              <a:t>list</a:t>
+            </a:r>
+            <a:r>
+              <a:rPr lang="zh-CN" altLang="en-US" dirty="0"/>
+              <a:t>集合賦值給有通配符的集合稱之</a:t>
+            </a:r>
+            <a:r>
+              <a:rPr lang="en-US" altLang="zh-CN" dirty="0"/>
+              <a:t>			               </a:t>
+            </a:r>
+            <a:r>
+              <a:rPr lang="zh-CN" altLang="en-US" dirty="0"/>
+              <a:t>為協變</a:t>
+            </a:r>
+            <a:r>
+              <a:rPr lang="en-US" altLang="zh-CN" dirty="0"/>
+              <a:t>),</a:t>
+            </a:r>
+            <a:r>
+              <a:rPr lang="zh-CN" altLang="en-US" dirty="0"/>
+              <a:t>口诀是：协变只出不进！</a:t>
+            </a:r>
+            <a:endParaRPr lang="en-US" altLang="zh-CN" dirty="0"/>
+          </a:p>
+          <a:p>
+            <a:endParaRPr lang="en-US" altLang="zh-CN" dirty="0"/>
+          </a:p>
+          <a:p>
+            <a:r>
+              <a:rPr lang="en-US" altLang="zh-CN" dirty="0"/>
+              <a:t>	4.  List&lt;? super Animal&gt;       </a:t>
+            </a:r>
+            <a:r>
+              <a:rPr lang="zh-CN" altLang="en-US" dirty="0"/>
+              <a:t>指定通配符的下限就是为了支持类型型变。比如</a:t>
+            </a:r>
+            <a:r>
+              <a:rPr lang="en-US" altLang="zh-CN" dirty="0"/>
+              <a:t>Foo</a:t>
+            </a:r>
+            <a:r>
+              <a:rPr lang="zh-CN" altLang="en-US" dirty="0"/>
+              <a:t>是</a:t>
+            </a:r>
+            <a:r>
+              <a:rPr lang="en-US" altLang="zh-CN" dirty="0"/>
+              <a:t>Bar</a:t>
+            </a:r>
+            <a:r>
+              <a:rPr lang="zh-CN" altLang="en-US" dirty="0"/>
+              <a:t>的子</a:t>
+            </a:r>
+            <a:r>
+              <a:rPr lang="zh-TW" altLang="en-US" dirty="0"/>
+              <a:t>类，当程序需要   </a:t>
+            </a:r>
+            <a:endParaRPr lang="en-US" altLang="zh-TW" dirty="0"/>
+          </a:p>
+          <a:p>
+            <a:r>
+              <a:rPr lang="en-US" altLang="zh-TW" dirty="0"/>
+              <a:t>                                                                    </a:t>
+            </a:r>
+            <a:r>
+              <a:rPr lang="zh-TW" altLang="en-US" dirty="0"/>
+              <a:t>一个</a:t>
+            </a:r>
+            <a:r>
+              <a:rPr lang="en-US" altLang="zh-TW" dirty="0"/>
+              <a:t>A&lt;? super Foo&gt;</a:t>
+            </a:r>
+            <a:r>
+              <a:rPr lang="zh-TW" altLang="en-US" dirty="0"/>
+              <a:t>变量时，程序可以将</a:t>
+            </a:r>
+            <a:r>
+              <a:rPr lang="en-US" altLang="zh-TW" dirty="0"/>
+              <a:t>A&lt;Bar&gt;</a:t>
+            </a:r>
+            <a:r>
+              <a:rPr lang="zh-TW" altLang="en-US" dirty="0"/>
+              <a:t>、</a:t>
+            </a:r>
+            <a:r>
+              <a:rPr lang="en-US" altLang="zh-TW" dirty="0"/>
+              <a:t>A&lt;Object&gt;</a:t>
+            </a:r>
+            <a:r>
+              <a:rPr lang="zh-TW" altLang="en-US" dirty="0"/>
+              <a:t>赋值给</a:t>
+            </a:r>
+            <a:r>
+              <a:rPr lang="en-US" altLang="zh-TW" dirty="0"/>
+              <a:t>A&lt;? super </a:t>
+            </a:r>
+          </a:p>
+          <a:p>
+            <a:r>
+              <a:rPr lang="en-US" altLang="zh-TW" dirty="0"/>
+              <a:t>                                                                    Foo&gt;</a:t>
+            </a:r>
+            <a:r>
+              <a:rPr lang="zh-TW" altLang="en-US" dirty="0"/>
+              <a:t>类型的变量，这种型变方式被称为逆变。 </a:t>
+            </a:r>
+            <a:r>
+              <a:rPr lang="zh-CN" altLang="en-US" dirty="0"/>
+              <a:t>口訣</a:t>
+            </a:r>
+            <a:r>
+              <a:rPr lang="en-US" altLang="zh-CN"/>
+              <a:t>:</a:t>
+            </a:r>
+            <a:r>
+              <a:rPr lang="zh-CN" altLang="en-US"/>
+              <a:t>逆变只进不出</a:t>
             </a:r>
             <a:endParaRPr lang="en-US" altLang="zh-CN" dirty="0"/>
           </a:p>

</xml_diff>

<commit_message>
Add the GenericTypt into pptx
</commit_message>
<xml_diff>
--- a/JavaStudy/JavaStudyNote/GenericType/GenericType.pptx
+++ b/JavaStudy/JavaStudyNote/GenericType/GenericType.pptx
@@ -263,7 +263,7 @@
           <a:p>
             <a:fld id="{3DBF0C44-33E9-41EF-A3D1-86D52FE28D82}" type="datetimeFigureOut">
               <a:rPr lang="zh-TW" altLang="en-US" smtClean="0"/>
-              <a:t>2023/2/25</a:t>
+              <a:t>2023/2/27</a:t>
             </a:fld>
             <a:endParaRPr lang="zh-TW" altLang="en-US"/>
           </a:p>
@@ -461,7 +461,7 @@
           <a:p>
             <a:fld id="{3DBF0C44-33E9-41EF-A3D1-86D52FE28D82}" type="datetimeFigureOut">
               <a:rPr lang="zh-TW" altLang="en-US" smtClean="0"/>
-              <a:t>2023/2/25</a:t>
+              <a:t>2023/2/27</a:t>
             </a:fld>
             <a:endParaRPr lang="zh-TW" altLang="en-US"/>
           </a:p>
@@ -669,7 +669,7 @@
           <a:p>
             <a:fld id="{3DBF0C44-33E9-41EF-A3D1-86D52FE28D82}" type="datetimeFigureOut">
               <a:rPr lang="zh-TW" altLang="en-US" smtClean="0"/>
-              <a:t>2023/2/25</a:t>
+              <a:t>2023/2/27</a:t>
             </a:fld>
             <a:endParaRPr lang="zh-TW" altLang="en-US"/>
           </a:p>
@@ -867,7 +867,7 @@
           <a:p>
             <a:fld id="{3DBF0C44-33E9-41EF-A3D1-86D52FE28D82}" type="datetimeFigureOut">
               <a:rPr lang="zh-TW" altLang="en-US" smtClean="0"/>
-              <a:t>2023/2/25</a:t>
+              <a:t>2023/2/27</a:t>
             </a:fld>
             <a:endParaRPr lang="zh-TW" altLang="en-US"/>
           </a:p>
@@ -1142,7 +1142,7 @@
           <a:p>
             <a:fld id="{3DBF0C44-33E9-41EF-A3D1-86D52FE28D82}" type="datetimeFigureOut">
               <a:rPr lang="zh-TW" altLang="en-US" smtClean="0"/>
-              <a:t>2023/2/25</a:t>
+              <a:t>2023/2/27</a:t>
             </a:fld>
             <a:endParaRPr lang="zh-TW" altLang="en-US"/>
           </a:p>
@@ -1407,7 +1407,7 @@
           <a:p>
             <a:fld id="{3DBF0C44-33E9-41EF-A3D1-86D52FE28D82}" type="datetimeFigureOut">
               <a:rPr lang="zh-TW" altLang="en-US" smtClean="0"/>
-              <a:t>2023/2/25</a:t>
+              <a:t>2023/2/27</a:t>
             </a:fld>
             <a:endParaRPr lang="zh-TW" altLang="en-US"/>
           </a:p>
@@ -1819,7 +1819,7 @@
           <a:p>
             <a:fld id="{3DBF0C44-33E9-41EF-A3D1-86D52FE28D82}" type="datetimeFigureOut">
               <a:rPr lang="zh-TW" altLang="en-US" smtClean="0"/>
-              <a:t>2023/2/25</a:t>
+              <a:t>2023/2/27</a:t>
             </a:fld>
             <a:endParaRPr lang="zh-TW" altLang="en-US"/>
           </a:p>
@@ -1960,7 +1960,7 @@
           <a:p>
             <a:fld id="{3DBF0C44-33E9-41EF-A3D1-86D52FE28D82}" type="datetimeFigureOut">
               <a:rPr lang="zh-TW" altLang="en-US" smtClean="0"/>
-              <a:t>2023/2/25</a:t>
+              <a:t>2023/2/27</a:t>
             </a:fld>
             <a:endParaRPr lang="zh-TW" altLang="en-US"/>
           </a:p>
@@ -2073,7 +2073,7 @@
           <a:p>
             <a:fld id="{3DBF0C44-33E9-41EF-A3D1-86D52FE28D82}" type="datetimeFigureOut">
               <a:rPr lang="zh-TW" altLang="en-US" smtClean="0"/>
-              <a:t>2023/2/25</a:t>
+              <a:t>2023/2/27</a:t>
             </a:fld>
             <a:endParaRPr lang="zh-TW" altLang="en-US"/>
           </a:p>
@@ -2384,7 +2384,7 @@
           <a:p>
             <a:fld id="{3DBF0C44-33E9-41EF-A3D1-86D52FE28D82}" type="datetimeFigureOut">
               <a:rPr lang="zh-TW" altLang="en-US" smtClean="0"/>
-              <a:t>2023/2/25</a:t>
+              <a:t>2023/2/27</a:t>
             </a:fld>
             <a:endParaRPr lang="zh-TW" altLang="en-US"/>
           </a:p>
@@ -2672,7 +2672,7 @@
           <a:p>
             <a:fld id="{3DBF0C44-33E9-41EF-A3D1-86D52FE28D82}" type="datetimeFigureOut">
               <a:rPr lang="zh-TW" altLang="en-US" smtClean="0"/>
-              <a:t>2023/2/25</a:t>
+              <a:t>2023/2/27</a:t>
             </a:fld>
             <a:endParaRPr lang="zh-TW" altLang="en-US"/>
           </a:p>
@@ -2913,7 +2913,7 @@
           <a:p>
             <a:fld id="{3DBF0C44-33E9-41EF-A3D1-86D52FE28D82}" type="datetimeFigureOut">
               <a:rPr lang="zh-TW" altLang="en-US" smtClean="0"/>
-              <a:t>2023/2/25</a:t>
+              <a:t>2023/2/27</a:t>
             </a:fld>
             <a:endParaRPr lang="zh-TW" altLang="en-US"/>
           </a:p>

</xml_diff>

<commit_message>
Add Generic Type study into pptx
</commit_message>
<xml_diff>
--- a/JavaStudy/JavaStudyNote/GenericType/GenericType.pptx
+++ b/JavaStudy/JavaStudyNote/GenericType/GenericType.pptx
@@ -10,6 +10,8 @@
     <p:sldId id="258" r:id="rId4"/>
     <p:sldId id="259" r:id="rId5"/>
     <p:sldId id="260" r:id="rId6"/>
+    <p:sldId id="261" r:id="rId7"/>
+    <p:sldId id="262" r:id="rId8"/>
   </p:sldIdLst>
   <p:sldSz cx="12192000" cy="6858000"/>
   <p:notesSz cx="6858000" cy="9144000"/>
@@ -263,7 +265,7 @@
           <a:p>
             <a:fld id="{3DBF0C44-33E9-41EF-A3D1-86D52FE28D82}" type="datetimeFigureOut">
               <a:rPr lang="zh-TW" altLang="en-US" smtClean="0"/>
-              <a:t>2023/2/27</a:t>
+              <a:t>2023/2/28</a:t>
             </a:fld>
             <a:endParaRPr lang="zh-TW" altLang="en-US"/>
           </a:p>
@@ -461,7 +463,7 @@
           <a:p>
             <a:fld id="{3DBF0C44-33E9-41EF-A3D1-86D52FE28D82}" type="datetimeFigureOut">
               <a:rPr lang="zh-TW" altLang="en-US" smtClean="0"/>
-              <a:t>2023/2/27</a:t>
+              <a:t>2023/2/28</a:t>
             </a:fld>
             <a:endParaRPr lang="zh-TW" altLang="en-US"/>
           </a:p>
@@ -669,7 +671,7 @@
           <a:p>
             <a:fld id="{3DBF0C44-33E9-41EF-A3D1-86D52FE28D82}" type="datetimeFigureOut">
               <a:rPr lang="zh-TW" altLang="en-US" smtClean="0"/>
-              <a:t>2023/2/27</a:t>
+              <a:t>2023/2/28</a:t>
             </a:fld>
             <a:endParaRPr lang="zh-TW" altLang="en-US"/>
           </a:p>
@@ -867,7 +869,7 @@
           <a:p>
             <a:fld id="{3DBF0C44-33E9-41EF-A3D1-86D52FE28D82}" type="datetimeFigureOut">
               <a:rPr lang="zh-TW" altLang="en-US" smtClean="0"/>
-              <a:t>2023/2/27</a:t>
+              <a:t>2023/2/28</a:t>
             </a:fld>
             <a:endParaRPr lang="zh-TW" altLang="en-US"/>
           </a:p>
@@ -1142,7 +1144,7 @@
           <a:p>
             <a:fld id="{3DBF0C44-33E9-41EF-A3D1-86D52FE28D82}" type="datetimeFigureOut">
               <a:rPr lang="zh-TW" altLang="en-US" smtClean="0"/>
-              <a:t>2023/2/27</a:t>
+              <a:t>2023/2/28</a:t>
             </a:fld>
             <a:endParaRPr lang="zh-TW" altLang="en-US"/>
           </a:p>
@@ -1407,7 +1409,7 @@
           <a:p>
             <a:fld id="{3DBF0C44-33E9-41EF-A3D1-86D52FE28D82}" type="datetimeFigureOut">
               <a:rPr lang="zh-TW" altLang="en-US" smtClean="0"/>
-              <a:t>2023/2/27</a:t>
+              <a:t>2023/2/28</a:t>
             </a:fld>
             <a:endParaRPr lang="zh-TW" altLang="en-US"/>
           </a:p>
@@ -1819,7 +1821,7 @@
           <a:p>
             <a:fld id="{3DBF0C44-33E9-41EF-A3D1-86D52FE28D82}" type="datetimeFigureOut">
               <a:rPr lang="zh-TW" altLang="en-US" smtClean="0"/>
-              <a:t>2023/2/27</a:t>
+              <a:t>2023/2/28</a:t>
             </a:fld>
             <a:endParaRPr lang="zh-TW" altLang="en-US"/>
           </a:p>
@@ -1960,7 +1962,7 @@
           <a:p>
             <a:fld id="{3DBF0C44-33E9-41EF-A3D1-86D52FE28D82}" type="datetimeFigureOut">
               <a:rPr lang="zh-TW" altLang="en-US" smtClean="0"/>
-              <a:t>2023/2/27</a:t>
+              <a:t>2023/2/28</a:t>
             </a:fld>
             <a:endParaRPr lang="zh-TW" altLang="en-US"/>
           </a:p>
@@ -2073,7 +2075,7 @@
           <a:p>
             <a:fld id="{3DBF0C44-33E9-41EF-A3D1-86D52FE28D82}" type="datetimeFigureOut">
               <a:rPr lang="zh-TW" altLang="en-US" smtClean="0"/>
-              <a:t>2023/2/27</a:t>
+              <a:t>2023/2/28</a:t>
             </a:fld>
             <a:endParaRPr lang="zh-TW" altLang="en-US"/>
           </a:p>
@@ -2384,7 +2386,7 @@
           <a:p>
             <a:fld id="{3DBF0C44-33E9-41EF-A3D1-86D52FE28D82}" type="datetimeFigureOut">
               <a:rPr lang="zh-TW" altLang="en-US" smtClean="0"/>
-              <a:t>2023/2/27</a:t>
+              <a:t>2023/2/28</a:t>
             </a:fld>
             <a:endParaRPr lang="zh-TW" altLang="en-US"/>
           </a:p>
@@ -2672,7 +2674,7 @@
           <a:p>
             <a:fld id="{3DBF0C44-33E9-41EF-A3D1-86D52FE28D82}" type="datetimeFigureOut">
               <a:rPr lang="zh-TW" altLang="en-US" smtClean="0"/>
-              <a:t>2023/2/27</a:t>
+              <a:t>2023/2/28</a:t>
             </a:fld>
             <a:endParaRPr lang="zh-TW" altLang="en-US"/>
           </a:p>
@@ -2913,7 +2915,7 @@
           <a:p>
             <a:fld id="{3DBF0C44-33E9-41EF-A3D1-86D52FE28D82}" type="datetimeFigureOut">
               <a:rPr lang="zh-TW" altLang="en-US" smtClean="0"/>
-              <a:t>2023/2/27</a:t>
+              <a:t>2023/2/28</a:t>
             </a:fld>
             <a:endParaRPr lang="zh-TW" altLang="en-US"/>
           </a:p>
@@ -4000,6 +4002,281 @@
 </p:sld>
 </file>
 
+<file path=ppt/slides/slide6.xml><?xml version="1.0" encoding="utf-8"?>
+<p:sld xmlns:a="http://schemas.openxmlformats.org/drawingml/2006/main" xmlns:r="http://schemas.openxmlformats.org/officeDocument/2006/relationships" xmlns:p="http://schemas.openxmlformats.org/presentationml/2006/main">
+  <p:cSld>
+    <p:spTree>
+      <p:nvGrpSpPr>
+        <p:cNvPr id="1" name=""/>
+        <p:cNvGrpSpPr/>
+        <p:nvPr/>
+      </p:nvGrpSpPr>
+      <p:grpSpPr>
+        <a:xfrm>
+          <a:off x="0" y="0"/>
+          <a:ext cx="0" cy="0"/>
+          <a:chOff x="0" y="0"/>
+          <a:chExt cx="0" cy="0"/>
+        </a:xfrm>
+      </p:grpSpPr>
+      <p:sp>
+        <p:nvSpPr>
+          <p:cNvPr id="4" name="文字方塊 3">
+            <a:extLst>
+              <a:ext uri="{FF2B5EF4-FFF2-40B4-BE49-F238E27FC236}">
+                <a16:creationId xmlns:a16="http://schemas.microsoft.com/office/drawing/2014/main" id="{7D027DC4-AC53-4790-B363-4613964AF6C3}"/>
+              </a:ext>
+            </a:extLst>
+          </p:cNvPr>
+          <p:cNvSpPr txBox="1"/>
+          <p:nvPr/>
+        </p:nvSpPr>
+        <p:spPr>
+          <a:xfrm>
+            <a:off x="294640" y="355600"/>
+            <a:ext cx="8597225" cy="2862322"/>
+          </a:xfrm>
+          <a:prstGeom prst="rect">
+            <a:avLst/>
+          </a:prstGeom>
+          <a:noFill/>
+        </p:spPr>
+        <p:txBody>
+          <a:bodyPr wrap="none" rtlCol="0">
+            <a:spAutoFit/>
+          </a:bodyPr>
+          <a:lstStyle/>
+          <a:p>
+            <a:r>
+              <a:rPr lang="zh-CN" altLang="en-US" b="1" u="sng" dirty="0"/>
+              <a:t>設置形參的上限</a:t>
+            </a:r>
+            <a:endParaRPr lang="en-US" altLang="zh-CN" b="1" u="sng" dirty="0"/>
+          </a:p>
+          <a:p>
+            <a:endParaRPr lang="en-US" altLang="zh-TW" dirty="0"/>
+          </a:p>
+          <a:p>
+            <a:r>
+              <a:rPr lang="en-US" altLang="zh-TW" dirty="0"/>
+              <a:t>	</a:t>
+            </a:r>
+            <a:r>
+              <a:rPr lang="en-US" altLang="zh-CN" dirty="0"/>
+              <a:t>1.   </a:t>
+            </a:r>
+            <a:r>
+              <a:rPr lang="zh-CN" altLang="en-US" dirty="0"/>
+              <a:t>泛型形参设定多个上限（至多有一个父类上限，可以有多个接口上限）</a:t>
+            </a:r>
+            <a:endParaRPr lang="en-US" altLang="zh-CN" dirty="0"/>
+          </a:p>
+          <a:p>
+            <a:r>
+              <a:rPr lang="en-US" altLang="zh-TW" dirty="0"/>
+              <a:t>		</a:t>
+            </a:r>
+            <a:r>
+              <a:rPr lang="en-US" altLang="zh-CN" dirty="0" err="1"/>
+              <a:t>e.g</a:t>
+            </a:r>
+            <a:endParaRPr lang="en-US" altLang="zh-CN" dirty="0"/>
+          </a:p>
+          <a:p>
+            <a:r>
+              <a:rPr lang="en-US" altLang="zh-TW" dirty="0"/>
+              <a:t>			public class A&lt;T extends Number &amp; </a:t>
+            </a:r>
+            <a:r>
+              <a:rPr lang="en-US" altLang="zh-TW" dirty="0" err="1"/>
+              <a:t>java.io.Serializable</a:t>
+            </a:r>
+            <a:r>
+              <a:rPr lang="en-US" altLang="zh-TW" dirty="0"/>
+              <a:t>&gt;{</a:t>
+            </a:r>
+          </a:p>
+          <a:p>
+            <a:r>
+              <a:rPr lang="en-US" altLang="zh-TW" dirty="0"/>
+              <a:t>			</a:t>
+            </a:r>
+          </a:p>
+          <a:p>
+            <a:r>
+              <a:rPr lang="en-US" altLang="zh-TW" dirty="0"/>
+              <a:t>			}</a:t>
+            </a:r>
+          </a:p>
+          <a:p>
+            <a:endParaRPr lang="en-US" altLang="zh-TW" dirty="0"/>
+          </a:p>
+          <a:p>
+            <a:r>
+              <a:rPr lang="en-US" altLang="zh-TW" dirty="0"/>
+              <a:t>			 T extends Number  --- </a:t>
+            </a:r>
+            <a:r>
+              <a:rPr lang="zh-CN" altLang="en-US" dirty="0"/>
+              <a:t>父類接口</a:t>
+            </a:r>
+            <a:endParaRPr lang="en-US" altLang="zh-CN" dirty="0"/>
+          </a:p>
+          <a:p>
+            <a:r>
+              <a:rPr lang="en-US" altLang="zh-TW" dirty="0"/>
+              <a:t>			 </a:t>
+            </a:r>
+            <a:r>
+              <a:rPr lang="en-US" altLang="zh-CN" dirty="0" err="1"/>
+              <a:t>java.io.Serializable</a:t>
+            </a:r>
+            <a:r>
+              <a:rPr lang="en-US" altLang="zh-CN" dirty="0"/>
+              <a:t>  --- </a:t>
+            </a:r>
+            <a:r>
+              <a:rPr lang="zh-CN" altLang="en-US" dirty="0"/>
+              <a:t>接口上限</a:t>
+            </a:r>
+            <a:endParaRPr lang="en-US" altLang="zh-TW" dirty="0"/>
+          </a:p>
+        </p:txBody>
+      </p:sp>
+    </p:spTree>
+    <p:extLst>
+      <p:ext uri="{BB962C8B-B14F-4D97-AF65-F5344CB8AC3E}">
+        <p14:creationId xmlns:p14="http://schemas.microsoft.com/office/powerpoint/2010/main" val="2738965011"/>
+      </p:ext>
+    </p:extLst>
+  </p:cSld>
+  <p:clrMapOvr>
+    <a:masterClrMapping/>
+  </p:clrMapOvr>
+</p:sld>
+</file>
+
+<file path=ppt/slides/slide7.xml><?xml version="1.0" encoding="utf-8"?>
+<p:sld xmlns:a="http://schemas.openxmlformats.org/drawingml/2006/main" xmlns:r="http://schemas.openxmlformats.org/officeDocument/2006/relationships" xmlns:p="http://schemas.openxmlformats.org/presentationml/2006/main">
+  <p:cSld>
+    <p:spTree>
+      <p:nvGrpSpPr>
+        <p:cNvPr id="1" name=""/>
+        <p:cNvGrpSpPr/>
+        <p:nvPr/>
+      </p:nvGrpSpPr>
+      <p:grpSpPr>
+        <a:xfrm>
+          <a:off x="0" y="0"/>
+          <a:ext cx="0" cy="0"/>
+          <a:chOff x="0" y="0"/>
+          <a:chExt cx="0" cy="0"/>
+        </a:xfrm>
+      </p:grpSpPr>
+      <p:sp>
+        <p:nvSpPr>
+          <p:cNvPr id="4" name="文字方塊 3">
+            <a:extLst>
+              <a:ext uri="{FF2B5EF4-FFF2-40B4-BE49-F238E27FC236}">
+                <a16:creationId xmlns:a16="http://schemas.microsoft.com/office/drawing/2014/main" id="{CC5BE36F-DEC6-4C76-B309-4E533364D451}"/>
+              </a:ext>
+            </a:extLst>
+          </p:cNvPr>
+          <p:cNvSpPr txBox="1"/>
+          <p:nvPr/>
+        </p:nvSpPr>
+        <p:spPr>
+          <a:xfrm>
+            <a:off x="375920" y="304800"/>
+            <a:ext cx="5970289" cy="1477328"/>
+          </a:xfrm>
+          <a:prstGeom prst="rect">
+            <a:avLst/>
+          </a:prstGeom>
+          <a:noFill/>
+        </p:spPr>
+        <p:txBody>
+          <a:bodyPr wrap="none" rtlCol="0">
+            <a:spAutoFit/>
+          </a:bodyPr>
+          <a:lstStyle/>
+          <a:p>
+            <a:r>
+              <a:rPr lang="zh-CN" altLang="en-US" dirty="0"/>
+              <a:t>範型方法</a:t>
+            </a:r>
+            <a:endParaRPr lang="en-US" altLang="zh-CN" dirty="0"/>
+          </a:p>
+          <a:p>
+            <a:endParaRPr lang="en-US" altLang="zh-TW" dirty="0"/>
+          </a:p>
+          <a:p>
+            <a:r>
+              <a:rPr lang="en-US" altLang="zh-TW" dirty="0"/>
+              <a:t>	</a:t>
+            </a:r>
+            <a:r>
+              <a:rPr lang="en-US" altLang="zh-CN" dirty="0"/>
+              <a:t>1.     </a:t>
+            </a:r>
+            <a:r>
+              <a:rPr lang="zh-CN" altLang="en-US" dirty="0"/>
+              <a:t>修飾符 </a:t>
+            </a:r>
+            <a:r>
+              <a:rPr lang="en-US" altLang="zh-CN" dirty="0"/>
+              <a:t>&lt;T, S&gt;  </a:t>
+            </a:r>
+            <a:r>
+              <a:rPr lang="zh-CN" altLang="en-US" dirty="0"/>
+              <a:t>返回值類型 方法名</a:t>
+            </a:r>
+            <a:r>
+              <a:rPr lang="en-US" altLang="zh-CN" dirty="0"/>
+              <a:t>(</a:t>
+            </a:r>
+            <a:r>
+              <a:rPr lang="zh-CN" altLang="en-US" dirty="0"/>
+              <a:t>形參列表</a:t>
+            </a:r>
+            <a:r>
+              <a:rPr lang="en-US" altLang="zh-CN" dirty="0"/>
+              <a:t>){</a:t>
+            </a:r>
+          </a:p>
+          <a:p>
+            <a:r>
+              <a:rPr lang="en-US" altLang="zh-CN" dirty="0"/>
+              <a:t>		//</a:t>
+            </a:r>
+            <a:r>
+              <a:rPr lang="zh-CN" altLang="en-US" dirty="0"/>
+              <a:t>方法躰</a:t>
+            </a:r>
+            <a:endParaRPr lang="en-US" altLang="zh-CN" dirty="0"/>
+          </a:p>
+          <a:p>
+            <a:r>
+              <a:rPr lang="en-US" altLang="zh-CN" dirty="0"/>
+              <a:t>	          }</a:t>
+            </a:r>
+            <a:endParaRPr lang="zh-TW" altLang="en-US" dirty="0"/>
+          </a:p>
+        </p:txBody>
+      </p:sp>
+    </p:spTree>
+    <p:extLst>
+      <p:ext uri="{BB962C8B-B14F-4D97-AF65-F5344CB8AC3E}">
+        <p14:creationId xmlns:p14="http://schemas.microsoft.com/office/powerpoint/2010/main" val="2135491951"/>
+      </p:ext>
+    </p:extLst>
+  </p:cSld>
+  <p:clrMapOvr>
+    <a:masterClrMapping/>
+  </p:clrMapOvr>
+</p:sld>
+</file>
+
 <file path=ppt/theme/theme1.xml><?xml version="1.0" encoding="utf-8"?>
 <a:theme xmlns:a="http://schemas.openxmlformats.org/drawingml/2006/main" name="Office 佈景主題">
   <a:themeElements>

</xml_diff>